<commit_message>
Command and Visitor patterns
</commit_message>
<xml_diff>
--- a/education/Command and Visitor patterns.pptx
+++ b/education/Command and Visitor patterns.pptx
@@ -10,28 +10,27 @@
     <p:notesMasterId r:id="rId6"/>
   </p:notesMasterIdLst>
   <p:handoutMasterIdLst>
-    <p:handoutMasterId r:id="rId25"/>
+    <p:handoutMasterId r:id="rId24"/>
   </p:handoutMasterIdLst>
   <p:sldIdLst>
     <p:sldId id="287" r:id="rId5"/>
     <p:sldId id="268" r:id="rId7"/>
-    <p:sldId id="315" r:id="rId8"/>
-    <p:sldId id="314" r:id="rId9"/>
-    <p:sldId id="300" r:id="rId10"/>
-    <p:sldId id="267" r:id="rId11"/>
-    <p:sldId id="320" r:id="rId12"/>
-    <p:sldId id="281" r:id="rId13"/>
-    <p:sldId id="282" r:id="rId14"/>
-    <p:sldId id="317" r:id="rId15"/>
-    <p:sldId id="316" r:id="rId16"/>
-    <p:sldId id="318" r:id="rId17"/>
-    <p:sldId id="270" r:id="rId18"/>
-    <p:sldId id="279" r:id="rId19"/>
-    <p:sldId id="269" r:id="rId20"/>
+    <p:sldId id="314" r:id="rId8"/>
+    <p:sldId id="300" r:id="rId9"/>
+    <p:sldId id="267" r:id="rId10"/>
+    <p:sldId id="320" r:id="rId11"/>
+    <p:sldId id="281" r:id="rId12"/>
+    <p:sldId id="282" r:id="rId13"/>
+    <p:sldId id="317" r:id="rId14"/>
+    <p:sldId id="316" r:id="rId15"/>
+    <p:sldId id="318" r:id="rId16"/>
+    <p:sldId id="270" r:id="rId17"/>
+    <p:sldId id="279" r:id="rId18"/>
+    <p:sldId id="269" r:id="rId19"/>
+    <p:sldId id="333" r:id="rId20"/>
     <p:sldId id="280" r:id="rId21"/>
-    <p:sldId id="272" r:id="rId22"/>
-    <p:sldId id="273" r:id="rId23"/>
-    <p:sldId id="262" r:id="rId24"/>
+    <p:sldId id="273" r:id="rId22"/>
+    <p:sldId id="262" r:id="rId23"/>
   </p:sldIdLst>
   <p:sldSz cx="9144000" cy="6858000" type="screen4x3"/>
   <p:notesSz cx="6858000" cy="9144000"/>
@@ -1006,6 +1005,270 @@
             <a:r>
               <a:rPr lang="en-US"/>
               <a:t>a device for calculating floating-point numbers</a:t>
+            </a:r>
+            <a:endParaRPr lang="en-US"/>
+          </a:p>
+        </p:txBody>
+      </p:sp>
+      <p:sp>
+        <p:nvSpPr>
+          <p:cNvPr id="4" name="Slide Number Placeholder 3"/>
+          <p:cNvSpPr>
+            <a:spLocks noGrp="1"/>
+          </p:cNvSpPr>
+          <p:nvPr>
+            <p:ph type="sldNum" sz="quarter" idx="5"/>
+          </p:nvPr>
+        </p:nvSpPr>
+        <p:spPr/>
+        <p:txBody>
+          <a:bodyPr/>
+          <a:p>
+            <a:fld id="{21B2AA4F-B828-4D7C-AFD3-893933DAFCB4}" type="slidenum">
+              <a:rPr lang="en-US" smtClean="0"/>
+            </a:fld>
+            <a:endParaRPr lang="en-US"/>
+          </a:p>
+        </p:txBody>
+      </p:sp>
+    </p:spTree>
+  </p:cSld>
+  <p:clrMapOvr>
+    <a:masterClrMapping/>
+  </p:clrMapOvr>
+</p:notes>
+</file>
+
+<file path=ppt/notesSlides/notesSlide5.xml><?xml version="1.0" encoding="utf-8"?>
+<p:notes xmlns:a="http://schemas.openxmlformats.org/drawingml/2006/main" xmlns:r="http://schemas.openxmlformats.org/officeDocument/2006/relationships" xmlns:p="http://schemas.openxmlformats.org/presentationml/2006/main">
+  <p:cSld>
+    <p:spTree>
+      <p:nvGrpSpPr>
+        <p:cNvPr id="1" name=""/>
+        <p:cNvGrpSpPr/>
+        <p:nvPr/>
+      </p:nvGrpSpPr>
+      <p:grpSpPr/>
+      <p:sp>
+        <p:nvSpPr>
+          <p:cNvPr id="2" name="Slide Image Placeholder 1"/>
+          <p:cNvSpPr/>
+          <p:nvPr>
+            <p:ph type="sldImg" idx="2"/>
+          </p:nvPr>
+        </p:nvSpPr>
+        <p:spPr/>
+      </p:sp>
+      <p:sp>
+        <p:nvSpPr>
+          <p:cNvPr id="3" name="Text Placeholder 2"/>
+          <p:cNvSpPr/>
+          <p:nvPr>
+            <p:ph type="body" idx="3"/>
+          </p:nvPr>
+        </p:nvSpPr>
+        <p:spPr/>
+        <p:txBody>
+          <a:bodyPr/>
+          <a:p>
+            <a:pPr marL="171450" indent="-171450">
+              <a:buFont typeface="Arial" charset="0"/>
+              <a:buChar char="•"/>
+            </a:pPr>
+            <a:r>
+              <a:rPr lang="en-US"/>
+              <a:t>Visitor :</a:t>
+            </a:r>
+            <a:endParaRPr lang="en-US"/>
+          </a:p>
+          <a:p>
+            <a:r>
+              <a:rPr lang="en-US"/>
+              <a:t>Provides an abstract interface (a set of VisitConcretElementX methods) to work with</a:t>
+            </a:r>
+            <a:endParaRPr lang="en-US"/>
+          </a:p>
+          <a:p>
+            <a:r>
+              <a:rPr lang="en-US"/>
+              <a:t>objects of class ConcreteElementX. The name of the VisitConcretElementX method includes the name</a:t>
+            </a:r>
+            <a:endParaRPr lang="en-US"/>
+          </a:p>
+          <a:p>
+            <a:r>
+              <a:rPr lang="en-US"/>
+              <a:t>class, the instance of which causes this method.</a:t>
+            </a:r>
+            <a:endParaRPr lang="en-US"/>
+          </a:p>
+          <a:p>
+            <a:pPr marL="171450" indent="-171450">
+              <a:buFont typeface="Arial" charset="0"/>
+              <a:buChar char="•"/>
+            </a:pPr>
+            <a:r>
+              <a:rPr lang="en-US"/>
+              <a:t>ConcreteVisitor :</a:t>
+            </a:r>
+            <a:endParaRPr lang="en-US"/>
+          </a:p>
+          <a:p>
+            <a:r>
+              <a:rPr lang="en-US"/>
+              <a:t>It implements the abstract interface provided by the abstract class Visitor. Each</a:t>
+            </a:r>
+            <a:endParaRPr lang="en-US"/>
+          </a:p>
+          <a:p>
+            <a:r>
+              <a:rPr lang="en-US"/>
+              <a:t>The VisitConcretElementX operation implements a fragment of the algorithm specific to each</a:t>
+            </a:r>
+            <a:endParaRPr lang="en-US"/>
+          </a:p>
+          <a:p>
+            <a:r>
+              <a:rPr lang="en-US"/>
+              <a:t>of a separate ConcreteElement class.</a:t>
+            </a:r>
+            <a:endParaRPr lang="en-US"/>
+          </a:p>
+          <a:p>
+            <a:pPr marL="171450" indent="-171450">
+              <a:buFont typeface="Arial" charset="0"/>
+              <a:buChar char="•"/>
+            </a:pPr>
+            <a:r>
+              <a:rPr lang="en-US"/>
+              <a:t>Element:</a:t>
+            </a:r>
+            <a:endParaRPr lang="en-US"/>
+          </a:p>
+          <a:p>
+            <a:r>
+              <a:rPr lang="en-US"/>
+              <a:t>Provides an abstract Accept method that takes an argument of type Visitor.</a:t>
+            </a:r>
+            <a:endParaRPr lang="en-US"/>
+          </a:p>
+          <a:p>
+            <a:pPr marL="171450" indent="-171450">
+              <a:buFont typeface="Arial" charset="0"/>
+              <a:buChar char="•"/>
+            </a:pPr>
+            <a:r>
+              <a:rPr lang="en-US"/>
+              <a:t>ConcreteElement :</a:t>
+            </a:r>
+            <a:endParaRPr lang="en-US"/>
+          </a:p>
+          <a:p>
+            <a:r>
+              <a:rPr lang="en-US"/>
+              <a:t>Implements an abstract Accept method that takes an argument of type Visitor.</a:t>
+            </a:r>
+            <a:endParaRPr lang="en-US"/>
+          </a:p>
+          <a:p>
+            <a:pPr marL="171450" indent="-171450">
+              <a:buFont typeface="Arial" charset="0"/>
+              <a:buChar char="•"/>
+            </a:pPr>
+            <a:r>
+              <a:rPr lang="en-US"/>
+              <a:t>ObjectStructure:</a:t>
+            </a:r>
+            <a:endParaRPr lang="en-US"/>
+          </a:p>
+          <a:p>
+            <a:r>
+              <a:rPr lang="en-US"/>
+              <a:t>It is a collection of objects of type Element. Maybe, as an ordinary collection, so</a:t>
+            </a:r>
+            <a:endParaRPr lang="en-US"/>
+          </a:p>
+          <a:p>
+            <a:r>
+              <a:rPr lang="en-US"/>
+              <a:t>tree-like structure.</a:t>
+            </a:r>
+            <a:endParaRPr lang="en-US"/>
+          </a:p>
+        </p:txBody>
+      </p:sp>
+      <p:sp>
+        <p:nvSpPr>
+          <p:cNvPr id="4" name="Slide Number Placeholder 3"/>
+          <p:cNvSpPr>
+            <a:spLocks noGrp="1"/>
+          </p:cNvSpPr>
+          <p:nvPr>
+            <p:ph type="sldNum" sz="quarter" idx="5"/>
+          </p:nvPr>
+        </p:nvSpPr>
+        <p:spPr/>
+        <p:txBody>
+          <a:bodyPr/>
+          <a:p>
+            <a:fld id="{21B2AA4F-B828-4D7C-AFD3-893933DAFCB4}" type="slidenum">
+              <a:rPr lang="en-US" smtClean="0"/>
+            </a:fld>
+            <a:endParaRPr lang="en-US"/>
+          </a:p>
+        </p:txBody>
+      </p:sp>
+    </p:spTree>
+  </p:cSld>
+  <p:clrMapOvr>
+    <a:masterClrMapping/>
+  </p:clrMapOvr>
+</p:notes>
+</file>
+
+<file path=ppt/notesSlides/notesSlide6.xml><?xml version="1.0" encoding="utf-8"?>
+<p:notes xmlns:a="http://schemas.openxmlformats.org/drawingml/2006/main" xmlns:r="http://schemas.openxmlformats.org/officeDocument/2006/relationships" xmlns:p="http://schemas.openxmlformats.org/presentationml/2006/main">
+  <p:cSld>
+    <p:spTree>
+      <p:nvGrpSpPr>
+        <p:cNvPr id="1" name=""/>
+        <p:cNvGrpSpPr/>
+        <p:nvPr/>
+      </p:nvGrpSpPr>
+      <p:grpSpPr/>
+      <p:sp>
+        <p:nvSpPr>
+          <p:cNvPr id="2" name="Slide Image Placeholder 1"/>
+          <p:cNvSpPr/>
+          <p:nvPr>
+            <p:ph type="sldImg" idx="2"/>
+          </p:nvPr>
+        </p:nvSpPr>
+        <p:spPr/>
+      </p:sp>
+      <p:sp>
+        <p:nvSpPr>
+          <p:cNvPr id="3" name="Text Placeholder 2"/>
+          <p:cNvSpPr/>
+          <p:nvPr>
+            <p:ph type="body" idx="3"/>
+          </p:nvPr>
+        </p:nvSpPr>
+        <p:spPr/>
+        <p:txBody>
+          <a:bodyPr/>
+          <a:p>
+            <a:r>
+              <a:rPr lang="en-US"/>
+              <a:t>Santa must visit all the houses in town. In one house lives a boy, in another </a:t>
+            </a:r>
+            <a:r>
+              <a:rPr lang="uk-UA" altLang="en-US"/>
+              <a:t>- </a:t>
+            </a:r>
+            <a:r>
+              <a:rPr lang="en-US"/>
+              <a:t>girl . The task of Santa Claus to visit each house and fulfill the wishes of each child (who wants what), in other words, to perform certain operations in a certain house. For example, Santa Claus will tell the boy "fairy tale" and the girl will present "dresses".</a:t>
             </a:r>
             <a:endParaRPr lang="en-US"/>
           </a:p>
@@ -5535,42 +5798,13 @@
         <p:nvPr/>
       </p:nvGrpSpPr>
       <p:grpSpPr/>
-      <p:sp>
-        <p:nvSpPr>
-          <p:cNvPr id="5" name="Title 4"/>
-          <p:cNvSpPr>
-            <a:spLocks noGrp="1"/>
-          </p:cNvSpPr>
-          <p:nvPr>
-            <p:ph type="title"/>
-          </p:nvPr>
-        </p:nvSpPr>
-        <p:spPr>
-          <a:xfrm>
-            <a:off x="238760" y="122555"/>
-            <a:ext cx="3363595" cy="525780"/>
-          </a:xfrm>
-        </p:spPr>
-        <p:txBody>
-          <a:bodyPr/>
-          <a:p>
-            <a:r>
-              <a:rPr lang="en-US"/>
-              <a:t>Classes</a:t>
-            </a:r>
-            <a:endParaRPr lang="en-US"/>
-          </a:p>
-        </p:txBody>
-      </p:sp>
       <p:pic>
         <p:nvPicPr>
-          <p:cNvPr id="4" name="Table Placeholder 3"/>
+          <p:cNvPr id="5" name="Picture 4" descr="control"/>
           <p:cNvPicPr>
             <a:picLocks noChangeAspect="1"/>
           </p:cNvPicPr>
-          <p:nvPr>
-            <p:ph type="tbl" sz="quarter" idx="10"/>
-          </p:nvPr>
+          <p:nvPr/>
         </p:nvPicPr>
         <p:blipFill>
           <a:blip r:embed="rId1"/>
@@ -5580,8 +5814,8 @@
         </p:blipFill>
         <p:spPr>
           <a:xfrm>
-            <a:off x="3605530" y="137160"/>
-            <a:ext cx="5363845" cy="6126480"/>
+            <a:off x="6071235" y="118745"/>
+            <a:ext cx="2915285" cy="4180205"/>
           </a:xfrm>
           <a:prstGeom prst="rect">
             <a:avLst/>
@@ -5590,7 +5824,7 @@
       </p:pic>
       <p:pic>
         <p:nvPicPr>
-          <p:cNvPr id="6" name="Picture 5"/>
+          <p:cNvPr id="6" name="Picture 5" descr="ar"/>
           <p:cNvPicPr>
             <a:picLocks noChangeAspect="1"/>
           </p:cNvPicPr>
@@ -5604,8 +5838,34 @@
         </p:blipFill>
         <p:spPr>
           <a:xfrm>
-            <a:off x="822960" y="574040"/>
-            <a:ext cx="2945130" cy="5498465"/>
+            <a:off x="437515" y="101600"/>
+            <a:ext cx="2967990" cy="3442970"/>
+          </a:xfrm>
+          <a:prstGeom prst="rect">
+            <a:avLst/>
+          </a:prstGeom>
+        </p:spPr>
+      </p:pic>
+      <p:pic>
+        <p:nvPicPr>
+          <p:cNvPr id="7" name="Table Placeholder 6"/>
+          <p:cNvPicPr>
+            <a:picLocks noChangeAspect="1"/>
+          </p:cNvPicPr>
+          <p:nvPr>
+            <p:ph type="tbl" sz="quarter" idx="10"/>
+          </p:nvPr>
+        </p:nvPicPr>
+        <p:blipFill>
+          <a:blip r:embed="rId3"/>
+          <a:stretch>
+            <a:fillRect/>
+          </a:stretch>
+        </p:blipFill>
+        <p:spPr>
+          <a:xfrm>
+            <a:off x="2776220" y="3604260"/>
+            <a:ext cx="3139440" cy="2606040"/>
           </a:xfrm>
           <a:prstGeom prst="rect">
             <a:avLst/>
@@ -5629,86 +5889,137 @@
         <p:cNvGrpSpPr/>
         <p:nvPr/>
       </p:nvGrpSpPr>
-      <p:grpSpPr/>
-      <p:pic>
-        <p:nvPicPr>
-          <p:cNvPr id="5" name="Picture 4" descr="control"/>
-          <p:cNvPicPr>
-            <a:picLocks noChangeAspect="1"/>
-          </p:cNvPicPr>
+      <p:grpSpPr>
+        <a:xfrm>
+          <a:off x="0" y="0"/>
+          <a:ext cx="0" cy="0"/>
+          <a:chOff x="0" y="0"/>
+          <a:chExt cx="0" cy="0"/>
+        </a:xfrm>
+      </p:grpSpPr>
+      <p:sp>
+        <p:nvSpPr>
+          <p:cNvPr id="6" name="Заголовок 5"/>
+          <p:cNvSpPr>
+            <a:spLocks noGrp="1"/>
+          </p:cNvSpPr>
+          <p:nvPr>
+            <p:ph type="title"/>
+          </p:nvPr>
+        </p:nvSpPr>
+        <p:spPr/>
+        <p:txBody>
+          <a:bodyPr/>
+          <a:lstStyle/>
+          <a:p>
+            <a:r>
+              <a:rPr lang="en-US" altLang="uk-UA"/>
+              <a:t>When to use Command pattern</a:t>
+            </a:r>
+            <a:endParaRPr lang="en-US" altLang="uk-UA"/>
+          </a:p>
+        </p:txBody>
+      </p:sp>
+      <p:sp>
+        <p:nvSpPr>
+          <p:cNvPr id="2" name="Text Box 1"/>
+          <p:cNvSpPr txBox="1"/>
           <p:nvPr/>
-        </p:nvPicPr>
-        <p:blipFill>
-          <a:blip r:embed="rId1"/>
-          <a:stretch>
-            <a:fillRect/>
-          </a:stretch>
-        </p:blipFill>
-        <p:spPr>
-          <a:xfrm>
-            <a:off x="6071235" y="118745"/>
-            <a:ext cx="2915285" cy="4180205"/>
+        </p:nvSpPr>
+        <p:spPr>
+          <a:xfrm>
+            <a:off x="691515" y="1472565"/>
+            <a:ext cx="7771765" cy="3383280"/>
           </a:xfrm>
           <a:prstGeom prst="rect">
             <a:avLst/>
           </a:prstGeom>
-        </p:spPr>
-      </p:pic>
-      <p:pic>
-        <p:nvPicPr>
-          <p:cNvPr id="6" name="Picture 5" descr="ar"/>
-          <p:cNvPicPr>
-            <a:picLocks noChangeAspect="1"/>
-          </p:cNvPicPr>
-          <p:nvPr/>
-        </p:nvPicPr>
-        <p:blipFill>
-          <a:blip r:embed="rId2"/>
-          <a:stretch>
-            <a:fillRect/>
-          </a:stretch>
-        </p:blipFill>
-        <p:spPr>
-          <a:xfrm>
-            <a:off x="437515" y="101600"/>
-            <a:ext cx="2967990" cy="3442970"/>
-          </a:xfrm>
-          <a:prstGeom prst="rect">
-            <a:avLst/>
-          </a:prstGeom>
-        </p:spPr>
-      </p:pic>
-      <p:pic>
-        <p:nvPicPr>
-          <p:cNvPr id="7" name="Table Placeholder 6"/>
-          <p:cNvPicPr>
-            <a:picLocks noChangeAspect="1"/>
-          </p:cNvPicPr>
-          <p:nvPr>
-            <p:ph type="tbl" sz="quarter" idx="10"/>
-          </p:nvPr>
-        </p:nvPicPr>
-        <p:blipFill>
-          <a:blip r:embed="rId3"/>
-          <a:stretch>
-            <a:fillRect/>
-          </a:stretch>
-        </p:blipFill>
-        <p:spPr>
-          <a:xfrm>
-            <a:off x="2776220" y="3604260"/>
-            <a:ext cx="3139440" cy="2606040"/>
-          </a:xfrm>
-          <a:prstGeom prst="rect">
-            <a:avLst/>
-          </a:prstGeom>
-        </p:spPr>
-      </p:pic>
+          <a:noFill/>
+        </p:spPr>
+        <p:txBody>
+          <a:bodyPr wrap="square" rtlCol="0" anchor="t">
+            <a:spAutoFit/>
+          </a:bodyPr>
+          <a:p>
+            <a:pPr marL="342900" indent="-342900">
+              <a:lnSpc>
+                <a:spcPct val="200000"/>
+              </a:lnSpc>
+              <a:buFont typeface="Arial" charset="0"/>
+              <a:buChar char="•"/>
+            </a:pPr>
+            <a:r>
+              <a:rPr lang="en-US"/>
+              <a:t>When you need to parameterize the command objects with the action that you perform, for example, buttons or menu items</a:t>
+            </a:r>
+            <a:endParaRPr lang="en-US"/>
+          </a:p>
+          <a:p>
+            <a:pPr marL="342900" indent="-342900">
+              <a:lnSpc>
+                <a:spcPct val="200000"/>
+              </a:lnSpc>
+              <a:buFont typeface="Arial" charset="0"/>
+              <a:buChar char="•"/>
+            </a:pPr>
+            <a:r>
+              <a:rPr lang="en-US"/>
+              <a:t>When it is necessary to ensure </a:t>
+            </a:r>
+            <a:r>
+              <a:rPr lang="en-US">
+                <a:sym typeface="+mn-ea"/>
+              </a:rPr>
+              <a:t>cancel </a:t>
+            </a:r>
+            <a:r>
+              <a:rPr lang="en-US"/>
+              <a:t>operation</a:t>
+            </a:r>
+            <a:endParaRPr lang="en-US"/>
+          </a:p>
+          <a:p>
+            <a:pPr marL="342900" indent="-342900">
+              <a:lnSpc>
+                <a:spcPct val="200000"/>
+              </a:lnSpc>
+              <a:buFont typeface="Arial" charset="0"/>
+              <a:buChar char="•"/>
+            </a:pPr>
+            <a:r>
+              <a:rPr lang="en-US"/>
+              <a:t>When it is necessary to organize the time-diversity addition of requests to the queue and their execution </a:t>
+            </a:r>
+            <a:endParaRPr lang="en-US"/>
+          </a:p>
+          <a:p>
+            <a:pPr marL="342900" indent="-342900">
+              <a:lnSpc>
+                <a:spcPct val="200000"/>
+              </a:lnSpc>
+              <a:buFont typeface="Arial" charset="0"/>
+              <a:buChar char="•"/>
+            </a:pPr>
+            <a:r>
+              <a:rPr lang="en-US"/>
+              <a:t>When you need to create a system based on transactions</a:t>
+            </a:r>
+            <a:endParaRPr lang="en-US"/>
+          </a:p>
+        </p:txBody>
+      </p:sp>
     </p:spTree>
   </p:cSld>
   <p:clrMapOvr>
     <a:masterClrMapping/>
   </p:clrMapOvr>
+  <p:timing>
+    <p:tnLst>
+      <p:par>
+        <p:cTn id="1" dur="indefinite" restart="never" nodeType="tmRoot"/>
+      </p:par>
+    </p:tnLst>
+  </p:timing>
 </p:sld>
 </file>
 
@@ -5731,24 +6042,86 @@
       </p:grpSpPr>
       <p:sp>
         <p:nvSpPr>
-          <p:cNvPr id="6" name="Заголовок 5"/>
+          <p:cNvPr id="14" name="Подзаголовок 13"/>
           <p:cNvSpPr>
             <a:spLocks noGrp="1"/>
           </p:cNvSpPr>
           <p:nvPr>
-            <p:ph type="title"/>
+            <p:ph type="subTitle" idx="4294967295"/>
           </p:nvPr>
         </p:nvSpPr>
-        <p:spPr/>
+        <p:spPr>
+          <a:xfrm>
+            <a:off x="281214" y="908050"/>
+            <a:ext cx="7366083" cy="454573"/>
+          </a:xfrm>
+        </p:spPr>
         <p:txBody>
-          <a:bodyPr/>
+          <a:bodyPr>
+            <a:normAutofit fontScale="90000" lnSpcReduction="20000"/>
+          </a:bodyPr>
           <a:lstStyle/>
           <a:p>
-            <a:r>
-              <a:rPr lang="en-US" altLang="uk-UA"/>
-              <a:t>When to use Command pattern</a:t>
-            </a:r>
-            <a:endParaRPr lang="en-US" altLang="uk-UA"/>
+            <a:pPr marL="0" indent="0">
+              <a:buNone/>
+            </a:pPr>
+            <a:r>
+              <a:rPr lang="en-US" altLang="uk-UA" dirty="0">
+                <a:solidFill>
+                  <a:schemeClr val="tx1"/>
+                </a:solidFill>
+                <a:effectLst>
+                  <a:outerShdw blurRad="38100" dist="19050" dir="2700000" algn="tl" rotWithShape="0">
+                    <a:schemeClr val="dk1">
+                      <a:alpha val="40000"/>
+                    </a:schemeClr>
+                  </a:outerShdw>
+                </a:effectLst>
+              </a:rPr>
+              <a:t>E</a:t>
+            </a:r>
+            <a:r>
+              <a:rPr lang="uk-UA" dirty="0">
+                <a:solidFill>
+                  <a:schemeClr val="tx1"/>
+                </a:solidFill>
+                <a:effectLst>
+                  <a:outerShdw blurRad="38100" dist="19050" dir="2700000" algn="tl" rotWithShape="0">
+                    <a:schemeClr val="dk1">
+                      <a:alpha val="40000"/>
+                    </a:schemeClr>
+                  </a:outerShdw>
+                </a:effectLst>
+              </a:rPr>
+              <a:t>xamples in </a:t>
+            </a:r>
+            <a:r>
+              <a:rPr lang="en-US" dirty="0">
+                <a:solidFill>
+                  <a:schemeClr val="tx1"/>
+                </a:solidFill>
+                <a:effectLst>
+                  <a:outerShdw blurRad="38100" dist="19050" dir="2700000" algn="tl" rotWithShape="0">
+                    <a:schemeClr val="dk1">
+                      <a:alpha val="40000"/>
+                    </a:schemeClr>
+                  </a:outerShdw>
+                </a:effectLst>
+              </a:rPr>
+              <a:t>.Net</a:t>
+            </a:r>
+            <a:endParaRPr lang="en-US" dirty="0">
+              <a:solidFill>
+                <a:schemeClr val="tx1"/>
+              </a:solidFill>
+              <a:effectLst>
+                <a:outerShdw blurRad="38100" dist="19050" dir="2700000" algn="tl" rotWithShape="0">
+                  <a:schemeClr val="dk1">
+                    <a:alpha val="40000"/>
+                  </a:schemeClr>
+                </a:outerShdw>
+              </a:effectLst>
+            </a:endParaRPr>
           </a:p>
         </p:txBody>
       </p:sp>
@@ -5760,8 +6133,8 @@
         </p:nvSpPr>
         <p:spPr>
           <a:xfrm>
-            <a:off x="691515" y="1472565"/>
-            <a:ext cx="7771765" cy="3383280"/>
+            <a:off x="873125" y="2301240"/>
+            <a:ext cx="7513955" cy="1920240"/>
           </a:xfrm>
           <a:prstGeom prst="rect">
             <a:avLst/>
@@ -5773,70 +6146,76 @@
             <a:spAutoFit/>
           </a:bodyPr>
           <a:p>
-            <a:pPr marL="342900" indent="-342900">
+            <a:pPr marL="285750" indent="-285750">
               <a:lnSpc>
-                <a:spcPct val="200000"/>
+                <a:spcPct val="150000"/>
               </a:lnSpc>
               <a:buFont typeface="Arial" charset="0"/>
               <a:buChar char="•"/>
             </a:pPr>
             <a:r>
-              <a:rPr lang="en-US"/>
-              <a:t>When you need to parameterize the command objects with the action that you perform, for example, buttons or menu items</a:t>
-            </a:r>
-            <a:endParaRPr lang="en-US"/>
-          </a:p>
-          <a:p>
-            <a:pPr marL="342900" indent="-342900">
+              <a:rPr lang="en-US" sz="2000">
+                <a:solidFill>
+                  <a:schemeClr val="tx1"/>
+                </a:solidFill>
+                <a:effectLst>
+                  <a:outerShdw blurRad="38100" dist="19050" dir="2700000" algn="tl" rotWithShape="0">
+                    <a:schemeClr val="dk1">
+                      <a:alpha val="40000"/>
+                    </a:schemeClr>
+                  </a:outerShdw>
+                </a:effectLst>
+              </a:rPr>
+              <a:t>ICommand in WPF, on the basis of which the binding of operations to events of the user interface is constructed;</a:t>
+            </a:r>
+            <a:endParaRPr lang="en-US" sz="2000">
+              <a:solidFill>
+                <a:schemeClr val="tx1"/>
+              </a:solidFill>
+              <a:effectLst>
+                <a:outerShdw blurRad="38100" dist="19050" dir="2700000" algn="tl" rotWithShape="0">
+                  <a:schemeClr val="dk1">
+                    <a:alpha val="40000"/>
+                  </a:schemeClr>
+                </a:outerShdw>
+              </a:effectLst>
+            </a:endParaRPr>
+          </a:p>
+          <a:p>
+            <a:pPr marL="285750" indent="-285750">
               <a:lnSpc>
-                <a:spcPct val="200000"/>
+                <a:spcPct val="150000"/>
               </a:lnSpc>
               <a:buFont typeface="Arial" charset="0"/>
               <a:buChar char="•"/>
             </a:pPr>
             <a:r>
-              <a:rPr lang="en-US"/>
-              <a:t>When it is necessary to ensure </a:t>
-            </a:r>
-            <a:r>
-              <a:rPr lang="en-US">
-                <a:sym typeface="+mn-ea"/>
+              <a:rPr lang="en-US" sz="2000">
+                <a:solidFill>
+                  <a:schemeClr val="tx1"/>
+                </a:solidFill>
+                <a:effectLst>
+                  <a:outerShdw blurRad="38100" dist="19050" dir="2700000" algn="tl" rotWithShape="0">
+                    <a:schemeClr val="dk1">
+                      <a:alpha val="40000"/>
+                    </a:schemeClr>
+                  </a:outerShdw>
+                </a:effectLst>
               </a:rPr>
-              <a:t>cancel </a:t>
-            </a:r>
-            <a:r>
-              <a:rPr lang="en-US"/>
-              <a:t>operation</a:t>
-            </a:r>
-            <a:endParaRPr lang="en-US"/>
-          </a:p>
-          <a:p>
-            <a:pPr marL="342900" indent="-342900">
-              <a:lnSpc>
-                <a:spcPct val="200000"/>
-              </a:lnSpc>
-              <a:buFont typeface="Arial" charset="0"/>
-              <a:buChar char="•"/>
-            </a:pPr>
-            <a:r>
-              <a:rPr lang="en-US"/>
-              <a:t>When it is necessary to organize the time-diversity addition of requests to the queue and their execution </a:t>
-            </a:r>
-            <a:endParaRPr lang="en-US"/>
-          </a:p>
-          <a:p>
-            <a:pPr marL="342900" indent="-342900">
-              <a:lnSpc>
-                <a:spcPct val="200000"/>
-              </a:lnSpc>
-              <a:buFont typeface="Arial" charset="0"/>
-              <a:buChar char="•"/>
-            </a:pPr>
-            <a:r>
-              <a:rPr lang="en-US"/>
-              <a:t>When you need to create a system based on transactions</a:t>
-            </a:r>
-            <a:endParaRPr lang="en-US"/>
+              <a:t>IDbCommand in ADO.NET encapsulates an operation executed on the DBMS side;</a:t>
+            </a:r>
+            <a:endParaRPr lang="en-US" sz="2000">
+              <a:solidFill>
+                <a:schemeClr val="tx1"/>
+              </a:solidFill>
+              <a:effectLst>
+                <a:outerShdw blurRad="38100" dist="19050" dir="2700000" algn="tl" rotWithShape="0">
+                  <a:schemeClr val="dk1">
+                    <a:alpha val="40000"/>
+                  </a:schemeClr>
+                </a:outerShdw>
+              </a:effectLst>
+            </a:endParaRPr>
           </a:p>
         </p:txBody>
       </p:sp>
@@ -5874,86 +6253,24 @@
       </p:grpSpPr>
       <p:sp>
         <p:nvSpPr>
-          <p:cNvPr id="14" name="Подзаголовок 13"/>
+          <p:cNvPr id="6" name="Заголовок 5"/>
           <p:cNvSpPr>
             <a:spLocks noGrp="1"/>
           </p:cNvSpPr>
           <p:nvPr>
-            <p:ph type="subTitle" idx="4294967295"/>
+            <p:ph type="title"/>
           </p:nvPr>
         </p:nvSpPr>
-        <p:spPr>
-          <a:xfrm>
-            <a:off x="281214" y="908050"/>
-            <a:ext cx="7366083" cy="454573"/>
-          </a:xfrm>
-        </p:spPr>
+        <p:spPr/>
         <p:txBody>
-          <a:bodyPr>
-            <a:normAutofit fontScale="90000" lnSpcReduction="20000"/>
-          </a:bodyPr>
+          <a:bodyPr/>
           <a:lstStyle/>
           <a:p>
-            <a:pPr marL="0" indent="0">
-              <a:buNone/>
-            </a:pPr>
-            <a:r>
-              <a:rPr lang="en-US" altLang="uk-UA" dirty="0">
-                <a:solidFill>
-                  <a:schemeClr val="tx1"/>
-                </a:solidFill>
-                <a:effectLst>
-                  <a:outerShdw blurRad="38100" dist="19050" dir="2700000" algn="tl" rotWithShape="0">
-                    <a:schemeClr val="dk1">
-                      <a:alpha val="40000"/>
-                    </a:schemeClr>
-                  </a:outerShdw>
-                </a:effectLst>
-              </a:rPr>
-              <a:t>E</a:t>
-            </a:r>
-            <a:r>
-              <a:rPr lang="uk-UA" dirty="0">
-                <a:solidFill>
-                  <a:schemeClr val="tx1"/>
-                </a:solidFill>
-                <a:effectLst>
-                  <a:outerShdw blurRad="38100" dist="19050" dir="2700000" algn="tl" rotWithShape="0">
-                    <a:schemeClr val="dk1">
-                      <a:alpha val="40000"/>
-                    </a:schemeClr>
-                  </a:outerShdw>
-                </a:effectLst>
-              </a:rPr>
-              <a:t>xamples in </a:t>
-            </a:r>
-            <a:r>
-              <a:rPr lang="en-US" dirty="0">
-                <a:solidFill>
-                  <a:schemeClr val="tx1"/>
-                </a:solidFill>
-                <a:effectLst>
-                  <a:outerShdw blurRad="38100" dist="19050" dir="2700000" algn="tl" rotWithShape="0">
-                    <a:schemeClr val="dk1">
-                      <a:alpha val="40000"/>
-                    </a:schemeClr>
-                  </a:outerShdw>
-                </a:effectLst>
-              </a:rPr>
-              <a:t>.Net</a:t>
-            </a:r>
-            <a:endParaRPr lang="en-US" dirty="0">
-              <a:solidFill>
-                <a:schemeClr val="tx1"/>
-              </a:solidFill>
-              <a:effectLst>
-                <a:outerShdw blurRad="38100" dist="19050" dir="2700000" algn="tl" rotWithShape="0">
-                  <a:schemeClr val="dk1">
-                    <a:alpha val="40000"/>
-                  </a:schemeClr>
-                </a:outerShdw>
-              </a:effectLst>
-            </a:endParaRPr>
+            <a:r>
+              <a:rPr lang="en-US" altLang="uk-UA" b="1"/>
+              <a:t>Visitor pattern</a:t>
+            </a:r>
+            <a:endParaRPr lang="en-US" altLang="uk-UA" b="1"/>
           </a:p>
         </p:txBody>
       </p:sp>
@@ -5965,8 +6282,8 @@
         </p:nvSpPr>
         <p:spPr>
           <a:xfrm>
-            <a:off x="873125" y="2301240"/>
-            <a:ext cx="7513955" cy="1920240"/>
+            <a:off x="1075690" y="1570990"/>
+            <a:ext cx="7255510" cy="2148840"/>
           </a:xfrm>
           <a:prstGeom prst="rect">
             <a:avLst/>
@@ -5978,79 +6295,45 @@
             <a:spAutoFit/>
           </a:bodyPr>
           <a:p>
-            <a:pPr marL="285750" indent="-285750">
+            <a:pPr>
               <a:lnSpc>
                 <a:spcPct val="150000"/>
               </a:lnSpc>
-              <a:buFont typeface="Arial" charset="0"/>
-              <a:buChar char="•"/>
             </a:pPr>
             <a:r>
-              <a:rPr lang="en-US" sz="2000">
-                <a:solidFill>
-                  <a:schemeClr val="tx1"/>
-                </a:solidFill>
-                <a:effectLst>
-                  <a:outerShdw blurRad="38100" dist="19050" dir="2700000" algn="tl" rotWithShape="0">
-                    <a:schemeClr val="dk1">
-                      <a:alpha val="40000"/>
-                    </a:schemeClr>
-                  </a:outerShdw>
-                </a:effectLst>
-              </a:rPr>
-              <a:t>ICommand in WPF, on the basis of which the binding of operations to events of the user interface is constructed;</a:t>
-            </a:r>
-            <a:endParaRPr lang="en-US" sz="2000">
-              <a:solidFill>
-                <a:schemeClr val="tx1"/>
-              </a:solidFill>
-              <a:effectLst>
-                <a:outerShdw blurRad="38100" dist="19050" dir="2700000" algn="tl" rotWithShape="0">
-                  <a:schemeClr val="dk1">
-                    <a:alpha val="40000"/>
-                  </a:schemeClr>
-                </a:outerShdw>
-              </a:effectLst>
-            </a:endParaRPr>
-          </a:p>
-          <a:p>
-            <a:pPr marL="285750" indent="-285750">
-              <a:lnSpc>
-                <a:spcPct val="150000"/>
-              </a:lnSpc>
-              <a:buFont typeface="Arial" charset="0"/>
-              <a:buChar char="•"/>
-            </a:pPr>
-            <a:r>
-              <a:rPr lang="en-US" sz="2000">
-                <a:solidFill>
-                  <a:schemeClr val="tx1"/>
-                </a:solidFill>
-                <a:effectLst>
-                  <a:outerShdw blurRad="38100" dist="19050" dir="2700000" algn="tl" rotWithShape="0">
-                    <a:schemeClr val="dk1">
-                      <a:alpha val="40000"/>
-                    </a:schemeClr>
-                  </a:outerShdw>
-                </a:effectLst>
-              </a:rPr>
-              <a:t>IDbCommand in ADO.NET encapsulates an operation executed on the DBMS side;</a:t>
-            </a:r>
-            <a:endParaRPr lang="en-US" sz="2000">
-              <a:solidFill>
-                <a:schemeClr val="tx1"/>
-              </a:solidFill>
-              <a:effectLst>
-                <a:outerShdw blurRad="38100" dist="19050" dir="2700000" algn="tl" rotWithShape="0">
-                  <a:schemeClr val="dk1">
-                    <a:alpha val="40000"/>
-                  </a:schemeClr>
-                </a:outerShdw>
-              </a:effectLst>
-            </a:endParaRPr>
+              <a:rPr lang="en-US"/>
+              <a:t>The Visitor pattern allows you to uniformly bypass a set of elements with heterogeneous interfaces (that is, a set of objects of different classes without leading them to a common base type), and also allows you to add a new method (function) to the object class, without changing the class of this object .</a:t>
+            </a:r>
+            <a:endParaRPr lang="en-US"/>
           </a:p>
         </p:txBody>
       </p:sp>
+      <p:pic>
+        <p:nvPicPr>
+          <p:cNvPr id="3" name="Table Placeholder 2"/>
+          <p:cNvPicPr>
+            <a:picLocks noChangeAspect="1"/>
+          </p:cNvPicPr>
+          <p:nvPr>
+            <p:ph type="tbl" sz="quarter" idx="10"/>
+          </p:nvPr>
+        </p:nvPicPr>
+        <p:blipFill>
+          <a:blip r:embed="rId1"/>
+          <a:stretch>
+            <a:fillRect/>
+          </a:stretch>
+        </p:blipFill>
+        <p:spPr>
+          <a:xfrm>
+            <a:off x="1602740" y="3743960"/>
+            <a:ext cx="6532245" cy="2169795"/>
+          </a:xfrm>
+          <a:prstGeom prst="rect">
+            <a:avLst/>
+          </a:prstGeom>
+        </p:spPr>
+      </p:pic>
     </p:spTree>
   </p:cSld>
   <p:clrMapOvr>
@@ -6085,39 +6368,56 @@
       </p:grpSpPr>
       <p:sp>
         <p:nvSpPr>
-          <p:cNvPr id="7" name="Таблица 6"/>
+          <p:cNvPr id="2" name="Подзаголовок 1"/>
           <p:cNvSpPr>
             <a:spLocks noGrp="1"/>
           </p:cNvSpPr>
           <p:nvPr>
-            <p:ph type="tbl" sz="quarter" idx="10"/>
+            <p:ph type="subTitle" idx="4294967295"/>
           </p:nvPr>
         </p:nvSpPr>
-        <p:spPr/>
-      </p:sp>
-      <p:sp>
-        <p:nvSpPr>
-          <p:cNvPr id="6" name="Заголовок 5"/>
-          <p:cNvSpPr>
-            <a:spLocks noGrp="1"/>
-          </p:cNvSpPr>
+        <p:spPr>
+          <a:xfrm>
+            <a:off x="272144" y="908050"/>
+            <a:ext cx="7375154" cy="454573"/>
+          </a:xfrm>
+        </p:spPr>
+        <p:txBody>
+          <a:bodyPr>
+            <a:normAutofit lnSpcReduction="10000"/>
+          </a:bodyPr>
+          <a:lstStyle/>
+          <a:p>
+            <a:endParaRPr lang="uk-UA" dirty="0"/>
+          </a:p>
+        </p:txBody>
+      </p:sp>
+      <p:pic>
+        <p:nvPicPr>
+          <p:cNvPr id="6" name="Picture Placeholder 5"/>
+          <p:cNvPicPr>
+            <a:picLocks noChangeAspect="1"/>
+          </p:cNvPicPr>
           <p:nvPr>
-            <p:ph type="title"/>
+            <p:ph type="pic" sz="quarter" idx="10"/>
           </p:nvPr>
-        </p:nvSpPr>
-        <p:spPr/>
-        <p:txBody>
-          <a:bodyPr/>
-          <a:lstStyle/>
-          <a:p>
-            <a:r>
-              <a:rPr lang="en-US" altLang="uk-UA"/>
-              <a:t>Visitor pattern</a:t>
-            </a:r>
-            <a:endParaRPr lang="en-US" altLang="uk-UA"/>
-          </a:p>
-        </p:txBody>
-      </p:sp>
+        </p:nvPicPr>
+        <p:blipFill>
+          <a:blip r:embed="rId1"/>
+          <a:stretch>
+            <a:fillRect/>
+          </a:stretch>
+        </p:blipFill>
+        <p:spPr>
+          <a:xfrm>
+            <a:off x="925195" y="1437005"/>
+            <a:ext cx="6970395" cy="4596765"/>
+          </a:xfrm>
+          <a:prstGeom prst="rect">
+            <a:avLst/>
+          </a:prstGeom>
+        </p:spPr>
+      </p:pic>
     </p:spTree>
   </p:cSld>
   <p:clrMapOvr>
@@ -6142,83 +6442,36 @@
         <p:cNvGrpSpPr/>
         <p:nvPr/>
       </p:nvGrpSpPr>
-      <p:grpSpPr>
-        <a:xfrm>
-          <a:off x="0" y="0"/>
-          <a:ext cx="0" cy="0"/>
-          <a:chOff x="0" y="0"/>
-          <a:chExt cx="0" cy="0"/>
-        </a:xfrm>
-      </p:grpSpPr>
-      <p:sp>
-        <p:nvSpPr>
-          <p:cNvPr id="3" name="Текст 2"/>
-          <p:cNvSpPr>
-            <a:spLocks noGrp="1"/>
-          </p:cNvSpPr>
-          <p:nvPr>
-            <p:ph type="body" sz="half" idx="2"/>
-          </p:nvPr>
-        </p:nvSpPr>
-        <p:spPr/>
-        <p:txBody>
-          <a:bodyPr/>
-          <a:lstStyle/>
-          <a:p>
-            <a:endParaRPr lang="uk-UA"/>
-          </a:p>
-        </p:txBody>
-      </p:sp>
-      <p:sp>
-        <p:nvSpPr>
-          <p:cNvPr id="4" name="Рисунок 3"/>
-          <p:cNvSpPr>
-            <a:spLocks noGrp="1"/>
-          </p:cNvSpPr>
-          <p:nvPr>
-            <p:ph type="pic" sz="quarter" idx="10"/>
-          </p:nvPr>
-        </p:nvSpPr>
-        <p:spPr/>
-      </p:sp>
-      <p:sp>
-        <p:nvSpPr>
-          <p:cNvPr id="2" name="Подзаголовок 1"/>
-          <p:cNvSpPr>
-            <a:spLocks noGrp="1"/>
-          </p:cNvSpPr>
-          <p:nvPr>
-            <p:ph type="subTitle" idx="4294967295"/>
-          </p:nvPr>
-        </p:nvSpPr>
-        <p:spPr>
-          <a:xfrm>
-            <a:off x="272144" y="908050"/>
-            <a:ext cx="7375154" cy="454573"/>
-          </a:xfrm>
-        </p:spPr>
-        <p:txBody>
-          <a:bodyPr>
-            <a:normAutofit lnSpcReduction="10000"/>
-          </a:bodyPr>
-          <a:lstStyle/>
-          <a:p>
-            <a:endParaRPr lang="uk-UA" dirty="0"/>
-          </a:p>
-        </p:txBody>
-      </p:sp>
+      <p:grpSpPr/>
+      <p:pic>
+        <p:nvPicPr>
+          <p:cNvPr id="7" name="Picture 6" descr="Без імені"/>
+          <p:cNvPicPr>
+            <a:picLocks noChangeAspect="1"/>
+          </p:cNvPicPr>
+          <p:nvPr/>
+        </p:nvPicPr>
+        <p:blipFill>
+          <a:blip r:embed="rId1"/>
+          <a:stretch>
+            <a:fillRect/>
+          </a:stretch>
+        </p:blipFill>
+        <p:spPr>
+          <a:xfrm>
+            <a:off x="957580" y="1104900"/>
+            <a:ext cx="8035290" cy="3731895"/>
+          </a:xfrm>
+          <a:prstGeom prst="rect">
+            <a:avLst/>
+          </a:prstGeom>
+        </p:spPr>
+      </p:pic>
     </p:spTree>
   </p:cSld>
   <p:clrMapOvr>
     <a:masterClrMapping/>
   </p:clrMapOvr>
-  <p:timing>
-    <p:tnLst>
-      <p:par>
-        <p:cTn id="1" dur="indefinite" restart="never" nodeType="tmRoot"/>
-      </p:par>
-    </p:tnLst>
-  </p:timing>
 </p:sld>
 </file>
 
@@ -6239,56 +6492,32 @@
           <a:chExt cx="0" cy="0"/>
         </a:xfrm>
       </p:grpSpPr>
-      <p:sp>
-        <p:nvSpPr>
-          <p:cNvPr id="9" name="Текст 8"/>
-          <p:cNvSpPr>
-            <a:spLocks noGrp="1"/>
-          </p:cNvSpPr>
+      <p:pic>
+        <p:nvPicPr>
+          <p:cNvPr id="2" name="Table Placeholder 1"/>
+          <p:cNvPicPr>
+            <a:picLocks noChangeAspect="1"/>
+          </p:cNvPicPr>
           <p:nvPr>
-            <p:ph type="body" sz="half" idx="2"/>
+            <p:ph type="tbl" sz="quarter" idx="10"/>
           </p:nvPr>
-        </p:nvSpPr>
-        <p:spPr/>
-        <p:txBody>
-          <a:bodyPr/>
-          <a:lstStyle/>
-          <a:p>
-            <a:endParaRPr lang="uk-UA"/>
-          </a:p>
-        </p:txBody>
-      </p:sp>
-      <p:sp>
-        <p:nvSpPr>
-          <p:cNvPr id="8" name="Подзаголовок 7"/>
-          <p:cNvSpPr>
-            <a:spLocks noGrp="1"/>
-          </p:cNvSpPr>
-          <p:nvPr>
-            <p:ph type="subTitle" idx="1"/>
-          </p:nvPr>
-        </p:nvSpPr>
-        <p:spPr/>
-        <p:txBody>
-          <a:bodyPr/>
-          <a:lstStyle/>
-          <a:p>
-            <a:endParaRPr lang="uk-UA"/>
-          </a:p>
-        </p:txBody>
-      </p:sp>
-      <p:sp>
-        <p:nvSpPr>
-          <p:cNvPr id="10" name="Рисунок 9"/>
-          <p:cNvSpPr>
-            <a:spLocks noGrp="1"/>
-          </p:cNvSpPr>
-          <p:nvPr>
-            <p:ph type="pic" sz="quarter" idx="10"/>
-          </p:nvPr>
-        </p:nvSpPr>
-        <p:spPr/>
-      </p:sp>
+        </p:nvPicPr>
+        <p:blipFill>
+          <a:blip r:embed="rId1"/>
+          <a:stretch>
+            <a:fillRect/>
+          </a:stretch>
+        </p:blipFill>
+        <p:spPr>
+          <a:xfrm>
+            <a:off x="1974215" y="38735"/>
+            <a:ext cx="5791835" cy="6794500"/>
+          </a:xfrm>
+          <a:prstGeom prst="rect">
+            <a:avLst/>
+          </a:prstGeom>
+        </p:spPr>
+      </p:pic>
     </p:spTree>
   </p:cSld>
   <p:clrMapOvr>
@@ -6316,7 +6545,7 @@
       </p:grpSpPr>
       <p:sp>
         <p:nvSpPr>
-          <p:cNvPr id="14" name="Текст 13"/>
+          <p:cNvPr id="17" name="Текст 16"/>
           <p:cNvSpPr>
             <a:spLocks noGrp="1"/>
           </p:cNvSpPr>
@@ -6324,50 +6553,103 @@
             <p:ph type="body" sz="half" idx="2"/>
           </p:nvPr>
         </p:nvSpPr>
+        <p:spPr>
+          <a:xfrm>
+            <a:off x="272415" y="1233805"/>
+            <a:ext cx="8321040" cy="4535170"/>
+          </a:xfrm>
+        </p:spPr>
+        <p:txBody>
+          <a:bodyPr>
+            <a:normAutofit lnSpcReduction="20000"/>
+          </a:bodyPr>
+          <a:lstStyle/>
+          <a:p>
+            <a:pPr marL="342900" indent="-342900">
+              <a:lnSpc>
+                <a:spcPct val="150000"/>
+              </a:lnSpc>
+              <a:buFont typeface="Arial" charset="0"/>
+              <a:buChar char="•"/>
+            </a:pPr>
+            <a:r>
+              <a:rPr lang="uk-UA"/>
+              <a:t>When there are many objects of heterogeneous classes with different interfaces, and you want to perform a series of operations on each of these objects</a:t>
+            </a:r>
+            <a:endParaRPr lang="uk-UA"/>
+          </a:p>
+          <a:p>
+            <a:pPr marL="342900" indent="-342900">
+              <a:lnSpc>
+                <a:spcPct val="150000"/>
+              </a:lnSpc>
+              <a:buFont typeface="Arial" charset="0"/>
+              <a:buChar char="•"/>
+            </a:pPr>
+            <a:endParaRPr lang="uk-UA"/>
+          </a:p>
+          <a:p>
+            <a:pPr marL="342900" indent="-342900">
+              <a:lnSpc>
+                <a:spcPct val="150000"/>
+              </a:lnSpc>
+              <a:buFont typeface="Arial" charset="0"/>
+              <a:buChar char="•"/>
+            </a:pPr>
+            <a:r>
+              <a:rPr lang="uk-UA"/>
+              <a:t>When classes need to add the same set of operations without changing these classes</a:t>
+            </a:r>
+            <a:endParaRPr lang="uk-UA"/>
+          </a:p>
+          <a:p>
+            <a:pPr marL="342900" indent="-342900">
+              <a:lnSpc>
+                <a:spcPct val="150000"/>
+              </a:lnSpc>
+              <a:buFont typeface="Arial" charset="0"/>
+              <a:buChar char="•"/>
+            </a:pPr>
+            <a:endParaRPr lang="uk-UA"/>
+          </a:p>
+          <a:p>
+            <a:pPr marL="342900" indent="-342900">
+              <a:lnSpc>
+                <a:spcPct val="150000"/>
+              </a:lnSpc>
+              <a:buFont typeface="Arial" charset="0"/>
+              <a:buChar char="•"/>
+            </a:pPr>
+            <a:r>
+              <a:rPr lang="uk-UA"/>
+              <a:t>When new operations are often added to classes, the overall class structure is stable and practically unchanged</a:t>
+            </a:r>
+            <a:endParaRPr lang="uk-UA"/>
+          </a:p>
+        </p:txBody>
+      </p:sp>
+      <p:sp>
+        <p:nvSpPr>
+          <p:cNvPr id="16" name="Подзаголовок 15"/>
+          <p:cNvSpPr>
+            <a:spLocks noGrp="1"/>
+          </p:cNvSpPr>
+          <p:nvPr>
+            <p:ph type="subTitle" idx="1"/>
+          </p:nvPr>
+        </p:nvSpPr>
         <p:spPr/>
         <p:txBody>
           <a:bodyPr/>
           <a:lstStyle/>
           <a:p>
-            <a:endParaRPr lang="uk-UA"/>
+            <a:r>
+              <a:rPr lang="en-US"/>
+              <a:t>When to use pattern Visitor</a:t>
+            </a:r>
+            <a:endParaRPr lang="en-US"/>
           </a:p>
         </p:txBody>
-      </p:sp>
-      <p:sp>
-        <p:nvSpPr>
-          <p:cNvPr id="13" name="Подзаголовок 12"/>
-          <p:cNvSpPr>
-            <a:spLocks noGrp="1"/>
-          </p:cNvSpPr>
-          <p:nvPr>
-            <p:ph type="subTitle" idx="4294967295"/>
-          </p:nvPr>
-        </p:nvSpPr>
-        <p:spPr>
-          <a:xfrm>
-            <a:off x="272143" y="908050"/>
-            <a:ext cx="8674220" cy="501650"/>
-          </a:xfrm>
-        </p:spPr>
-        <p:txBody>
-          <a:bodyPr/>
-          <a:lstStyle/>
-          <a:p>
-            <a:endParaRPr lang="uk-UA"/>
-          </a:p>
-        </p:txBody>
-      </p:sp>
-      <p:sp>
-        <p:nvSpPr>
-          <p:cNvPr id="5" name="Chart Placeholder 4"/>
-          <p:cNvSpPr>
-            <a:spLocks noGrp="1"/>
-          </p:cNvSpPr>
-          <p:nvPr>
-            <p:ph type="chart" sz="quarter" idx="10"/>
-          </p:nvPr>
-        </p:nvSpPr>
-        <p:spPr/>
       </p:sp>
     </p:spTree>
   </p:cSld>
@@ -6403,88 +6685,6 @@
       </p:grpSpPr>
       <p:sp>
         <p:nvSpPr>
-          <p:cNvPr id="17" name="Текст 16"/>
-          <p:cNvSpPr>
-            <a:spLocks noGrp="1"/>
-          </p:cNvSpPr>
-          <p:nvPr>
-            <p:ph type="body" sz="half" idx="2"/>
-          </p:nvPr>
-        </p:nvSpPr>
-        <p:spPr/>
-        <p:txBody>
-          <a:bodyPr/>
-          <a:lstStyle/>
-          <a:p>
-            <a:endParaRPr lang="uk-UA"/>
-          </a:p>
-        </p:txBody>
-      </p:sp>
-      <p:sp>
-        <p:nvSpPr>
-          <p:cNvPr id="18" name="Диаграмма 17"/>
-          <p:cNvSpPr>
-            <a:spLocks noGrp="1"/>
-          </p:cNvSpPr>
-          <p:nvPr>
-            <p:ph type="chart" sz="quarter" idx="10"/>
-          </p:nvPr>
-        </p:nvSpPr>
-        <p:spPr/>
-      </p:sp>
-      <p:sp>
-        <p:nvSpPr>
-          <p:cNvPr id="16" name="Подзаголовок 15"/>
-          <p:cNvSpPr>
-            <a:spLocks noGrp="1"/>
-          </p:cNvSpPr>
-          <p:nvPr>
-            <p:ph type="subTitle" idx="1"/>
-          </p:nvPr>
-        </p:nvSpPr>
-        <p:spPr/>
-        <p:txBody>
-          <a:bodyPr/>
-          <a:lstStyle/>
-          <a:p>
-            <a:endParaRPr lang="uk-UA"/>
-          </a:p>
-        </p:txBody>
-      </p:sp>
-    </p:spTree>
-  </p:cSld>
-  <p:clrMapOvr>
-    <a:masterClrMapping/>
-  </p:clrMapOvr>
-  <p:timing>
-    <p:tnLst>
-      <p:par>
-        <p:cTn id="1" dur="indefinite" restart="never" nodeType="tmRoot"/>
-      </p:par>
-    </p:tnLst>
-  </p:timing>
-</p:sld>
-</file>
-
-<file path=ppt/slides/slide19.xml><?xml version="1.0" encoding="utf-8"?>
-<p:sld xmlns:a="http://schemas.openxmlformats.org/drawingml/2006/main" xmlns:r="http://schemas.openxmlformats.org/officeDocument/2006/relationships" xmlns:p="http://schemas.openxmlformats.org/presentationml/2006/main">
-  <p:cSld>
-    <p:spTree>
-      <p:nvGrpSpPr>
-        <p:cNvPr id="1" name=""/>
-        <p:cNvGrpSpPr/>
-        <p:nvPr/>
-      </p:nvGrpSpPr>
-      <p:grpSpPr>
-        <a:xfrm>
-          <a:off x="0" y="0"/>
-          <a:ext cx="0" cy="0"/>
-          <a:chOff x="0" y="0"/>
-          <a:chExt cx="0" cy="0"/>
-        </a:xfrm>
-      </p:grpSpPr>
-      <p:sp>
-        <p:nvSpPr>
           <p:cNvPr id="2" name="Заголовок 1"/>
           <p:cNvSpPr>
             <a:spLocks noGrp="1"/>
@@ -6537,22 +6737,17 @@
             <p:ph type="subTitle" idx="1"/>
           </p:nvPr>
         </p:nvSpPr>
-        <p:spPr>
-          <a:xfrm>
-            <a:off x="280670" y="1154430"/>
-            <a:ext cx="8641080" cy="454660"/>
-          </a:xfrm>
-        </p:spPr>
+        <p:spPr/>
         <p:txBody>
           <a:bodyPr/>
           <a:lstStyle/>
           <a:p>
             <a:pPr algn="ctr"/>
             <a:r>
-              <a:rPr lang="en-US" dirty="0"/>
+              <a:rPr lang="en-US" b="1" dirty="0"/>
               <a:t>Command pattern</a:t>
             </a:r>
-            <a:endParaRPr lang="en-US" dirty="0"/>
+            <a:endParaRPr lang="en-US" b="1" dirty="0"/>
           </a:p>
         </p:txBody>
       </p:sp>
@@ -6564,7 +6759,7 @@
         </p:nvSpPr>
         <p:spPr>
           <a:xfrm>
-            <a:off x="657225" y="2747010"/>
+            <a:off x="631825" y="1301750"/>
             <a:ext cx="7482205" cy="1737360"/>
           </a:xfrm>
           <a:prstGeom prst="rect">
@@ -6590,11 +6785,38 @@
           </a:p>
         </p:txBody>
       </p:sp>
+      <p:pic>
+        <p:nvPicPr>
+          <p:cNvPr id="3" name="Table Placeholder 2" descr="what-if-i-told-you-ui-buttons-also-use-command-pattern"/>
+          <p:cNvPicPr>
+            <a:picLocks noChangeAspect="1"/>
+          </p:cNvPicPr>
+          <p:nvPr>
+            <p:ph type="tbl" sz="quarter" idx="10"/>
+          </p:nvPr>
+        </p:nvPicPr>
+        <p:blipFill>
+          <a:blip r:embed="rId1"/>
+          <a:stretch>
+            <a:fillRect/>
+          </a:stretch>
+        </p:blipFill>
+        <p:spPr>
+          <a:xfrm>
+            <a:off x="2626995" y="2987040"/>
+            <a:ext cx="3810000" cy="3810000"/>
+          </a:xfrm>
+          <a:prstGeom prst="rect">
+            <a:avLst/>
+          </a:prstGeom>
+        </p:spPr>
+      </p:pic>
     </p:spTree>
   </p:cSld>
   <p:clrMapOvr>
     <a:masterClrMapping/>
   </p:clrMapOvr>
+  <p:transition/>
   <p:timing>
     <p:tnLst>
       <p:par>
@@ -6622,55 +6844,6 @@
           <a:chExt cx="0" cy="0"/>
         </a:xfrm>
       </p:grpSpPr>
-      <p:pic>
-        <p:nvPicPr>
-          <p:cNvPr id="2" name="Picture 1" descr="what-if-i-told-you-ui-buttons-also-use-command-pattern"/>
-          <p:cNvPicPr>
-            <a:picLocks noChangeAspect="1"/>
-          </p:cNvPicPr>
-          <p:nvPr/>
-        </p:nvPicPr>
-        <p:blipFill>
-          <a:blip r:embed="rId1"/>
-          <a:stretch>
-            <a:fillRect/>
-          </a:stretch>
-        </p:blipFill>
-        <p:spPr>
-          <a:xfrm>
-            <a:off x="2467610" y="1469390"/>
-            <a:ext cx="4090670" cy="4090670"/>
-          </a:xfrm>
-          <a:prstGeom prst="rect">
-            <a:avLst/>
-          </a:prstGeom>
-        </p:spPr>
-      </p:pic>
-    </p:spTree>
-  </p:cSld>
-  <p:clrMapOvr>
-    <a:masterClrMapping/>
-  </p:clrMapOvr>
-</p:sld>
-</file>
-
-<file path=ppt/slides/slide4.xml><?xml version="1.0" encoding="utf-8"?>
-<p:sld xmlns:a="http://schemas.openxmlformats.org/drawingml/2006/main" xmlns:r="http://schemas.openxmlformats.org/officeDocument/2006/relationships" xmlns:p="http://schemas.openxmlformats.org/presentationml/2006/main">
-  <p:cSld>
-    <p:spTree>
-      <p:nvGrpSpPr>
-        <p:cNvPr id="1" name=""/>
-        <p:cNvGrpSpPr/>
-        <p:nvPr/>
-      </p:nvGrpSpPr>
-      <p:grpSpPr>
-        <a:xfrm>
-          <a:off x="0" y="0"/>
-          <a:ext cx="0" cy="0"/>
-          <a:chOff x="0" y="0"/>
-          <a:chExt cx="0" cy="0"/>
-        </a:xfrm>
-      </p:grpSpPr>
       <p:sp>
         <p:nvSpPr>
           <p:cNvPr id="2" name="Subtitle 1"/>
@@ -6723,7 +6896,7 @@
 </p:sld>
 </file>
 
-<file path=ppt/slides/slide5.xml><?xml version="1.0" encoding="utf-8"?>
+<file path=ppt/slides/slide4.xml><?xml version="1.0" encoding="utf-8"?>
 <p:sld xmlns:a="http://schemas.openxmlformats.org/drawingml/2006/main" xmlns:r="http://schemas.openxmlformats.org/officeDocument/2006/relationships" xmlns:p="http://schemas.openxmlformats.org/presentationml/2006/main">
   <p:cSld>
     <p:spTree>
@@ -7334,7 +7507,7 @@
 </p:sld>
 </file>
 
-<file path=ppt/slides/slide6.xml><?xml version="1.0" encoding="utf-8"?>
+<file path=ppt/slides/slide5.xml><?xml version="1.0" encoding="utf-8"?>
 <p:sld xmlns:a="http://schemas.openxmlformats.org/drawingml/2006/main" xmlns:r="http://schemas.openxmlformats.org/officeDocument/2006/relationships" xmlns:p="http://schemas.openxmlformats.org/presentationml/2006/main">
   <p:cSld>
     <p:spTree>
@@ -7372,7 +7545,6 @@
           <a:p>
             <a:r>
               <a:rPr lang="en-US" altLang="en-US">
-                <a:ln/>
                 <a:solidFill>
                   <a:schemeClr val="tx1"/>
                 </a:solidFill>
@@ -7387,7 +7559,6 @@
               <a:t>Situation in our Life </a:t>
             </a:r>
             <a:endParaRPr lang="en-US" altLang="en-US">
-              <a:ln/>
               <a:solidFill>
                 <a:schemeClr val="tx1"/>
               </a:solidFill>
@@ -7467,7 +7638,7 @@
 </p:sld>
 </file>
 
-<file path=ppt/slides/slide7.xml><?xml version="1.0" encoding="utf-8"?>
+<file path=ppt/slides/slide6.xml><?xml version="1.0" encoding="utf-8"?>
 <p:sld xmlns:a="http://schemas.openxmlformats.org/drawingml/2006/main" xmlns:r="http://schemas.openxmlformats.org/officeDocument/2006/relationships" xmlns:p="http://schemas.openxmlformats.org/presentationml/2006/main">
   <p:cSld>
     <p:spTree>
@@ -7530,6 +7701,93 @@
   <p:clrMapOvr>
     <a:masterClrMapping/>
   </p:clrMapOvr>
+</p:sld>
+</file>
+
+<file path=ppt/slides/slide7.xml><?xml version="1.0" encoding="utf-8"?>
+<p:sld xmlns:a="http://schemas.openxmlformats.org/drawingml/2006/main" xmlns:r="http://schemas.openxmlformats.org/officeDocument/2006/relationships" xmlns:p="http://schemas.openxmlformats.org/presentationml/2006/main">
+  <p:cSld>
+    <p:spTree>
+      <p:nvGrpSpPr>
+        <p:cNvPr id="1" name=""/>
+        <p:cNvGrpSpPr/>
+        <p:nvPr/>
+      </p:nvGrpSpPr>
+      <p:grpSpPr>
+        <a:xfrm>
+          <a:off x="0" y="0"/>
+          <a:ext cx="0" cy="0"/>
+          <a:chOff x="0" y="0"/>
+          <a:chExt cx="0" cy="0"/>
+        </a:xfrm>
+      </p:grpSpPr>
+      <p:sp>
+        <p:nvSpPr>
+          <p:cNvPr id="6" name="Подзаголовок 5"/>
+          <p:cNvSpPr>
+            <a:spLocks noGrp="1"/>
+          </p:cNvSpPr>
+          <p:nvPr>
+            <p:ph type="subTitle" idx="1"/>
+          </p:nvPr>
+        </p:nvSpPr>
+        <p:spPr>
+          <a:xfrm>
+            <a:off x="273050" y="908050"/>
+            <a:ext cx="8623935" cy="454660"/>
+          </a:xfrm>
+        </p:spPr>
+        <p:txBody>
+          <a:bodyPr/>
+          <a:lstStyle/>
+          <a:p>
+            <a:pPr algn="ctr"/>
+            <a:r>
+              <a:rPr lang="en-US" altLang="uk-UA"/>
+              <a:t>Example - Calculator</a:t>
+            </a:r>
+            <a:endParaRPr lang="en-US" altLang="uk-UA"/>
+          </a:p>
+        </p:txBody>
+      </p:sp>
+      <p:pic>
+        <p:nvPicPr>
+          <p:cNvPr id="4" name="Table Placeholder 3" descr="calc"/>
+          <p:cNvPicPr>
+            <a:picLocks noChangeAspect="1"/>
+          </p:cNvPicPr>
+          <p:nvPr>
+            <p:ph type="tbl" sz="quarter" idx="10"/>
+          </p:nvPr>
+        </p:nvPicPr>
+        <p:blipFill>
+          <a:blip r:embed="rId1"/>
+          <a:stretch>
+            <a:fillRect/>
+          </a:stretch>
+        </p:blipFill>
+        <p:spPr>
+          <a:xfrm>
+            <a:off x="868680" y="2112010"/>
+            <a:ext cx="6978650" cy="3102610"/>
+          </a:xfrm>
+          <a:prstGeom prst="rect">
+            <a:avLst/>
+          </a:prstGeom>
+        </p:spPr>
+      </p:pic>
+    </p:spTree>
+  </p:cSld>
+  <p:clrMapOvr>
+    <a:masterClrMapping/>
+  </p:clrMapOvr>
+  <p:timing>
+    <p:tnLst>
+      <p:par>
+        <p:cTn id="1" dur="indefinite" restart="never" nodeType="tmRoot"/>
+      </p:par>
+    </p:tnLst>
+  </p:timing>
 </p:sld>
 </file>
 
@@ -7552,93 +7810,6 @@
       </p:grpSpPr>
       <p:sp>
         <p:nvSpPr>
-          <p:cNvPr id="6" name="Подзаголовок 5"/>
-          <p:cNvSpPr>
-            <a:spLocks noGrp="1"/>
-          </p:cNvSpPr>
-          <p:nvPr>
-            <p:ph type="subTitle" idx="1"/>
-          </p:nvPr>
-        </p:nvSpPr>
-        <p:spPr>
-          <a:xfrm>
-            <a:off x="273050" y="908050"/>
-            <a:ext cx="8623935" cy="454660"/>
-          </a:xfrm>
-        </p:spPr>
-        <p:txBody>
-          <a:bodyPr/>
-          <a:lstStyle/>
-          <a:p>
-            <a:pPr algn="ctr"/>
-            <a:r>
-              <a:rPr lang="en-US" altLang="uk-UA"/>
-              <a:t>Example - Calculator</a:t>
-            </a:r>
-            <a:endParaRPr lang="en-US" altLang="uk-UA"/>
-          </a:p>
-        </p:txBody>
-      </p:sp>
-      <p:pic>
-        <p:nvPicPr>
-          <p:cNvPr id="4" name="Table Placeholder 3" descr="calc"/>
-          <p:cNvPicPr>
-            <a:picLocks noChangeAspect="1"/>
-          </p:cNvPicPr>
-          <p:nvPr>
-            <p:ph type="tbl" sz="quarter" idx="10"/>
-          </p:nvPr>
-        </p:nvPicPr>
-        <p:blipFill>
-          <a:blip r:embed="rId1"/>
-          <a:stretch>
-            <a:fillRect/>
-          </a:stretch>
-        </p:blipFill>
-        <p:spPr>
-          <a:xfrm>
-            <a:off x="868680" y="2112010"/>
-            <a:ext cx="6978650" cy="3102610"/>
-          </a:xfrm>
-          <a:prstGeom prst="rect">
-            <a:avLst/>
-          </a:prstGeom>
-        </p:spPr>
-      </p:pic>
-    </p:spTree>
-  </p:cSld>
-  <p:clrMapOvr>
-    <a:masterClrMapping/>
-  </p:clrMapOvr>
-  <p:timing>
-    <p:tnLst>
-      <p:par>
-        <p:cTn id="1" dur="indefinite" restart="never" nodeType="tmRoot"/>
-      </p:par>
-    </p:tnLst>
-  </p:timing>
-</p:sld>
-</file>
-
-<file path=ppt/slides/slide9.xml><?xml version="1.0" encoding="utf-8"?>
-<p:sld xmlns:a="http://schemas.openxmlformats.org/drawingml/2006/main" xmlns:r="http://schemas.openxmlformats.org/officeDocument/2006/relationships" xmlns:p="http://schemas.openxmlformats.org/presentationml/2006/main">
-  <p:cSld>
-    <p:spTree>
-      <p:nvGrpSpPr>
-        <p:cNvPr id="1" name=""/>
-        <p:cNvGrpSpPr/>
-        <p:nvPr/>
-      </p:nvGrpSpPr>
-      <p:grpSpPr>
-        <a:xfrm>
-          <a:off x="0" y="0"/>
-          <a:ext cx="0" cy="0"/>
-          <a:chOff x="0" y="0"/>
-          <a:chExt cx="0" cy="0"/>
-        </a:xfrm>
-      </p:grpSpPr>
-      <p:sp>
-        <p:nvSpPr>
           <p:cNvPr id="3" name="Title 2"/>
           <p:cNvSpPr>
             <a:spLocks noGrp="1"/>
@@ -7679,6 +7850,101 @@
           <a:xfrm>
             <a:off x="438150" y="1183640"/>
             <a:ext cx="8315960" cy="4391025"/>
+          </a:xfrm>
+          <a:prstGeom prst="rect">
+            <a:avLst/>
+          </a:prstGeom>
+        </p:spPr>
+      </p:pic>
+    </p:spTree>
+  </p:cSld>
+  <p:clrMapOvr>
+    <a:masterClrMapping/>
+  </p:clrMapOvr>
+</p:sld>
+</file>
+
+<file path=ppt/slides/slide9.xml><?xml version="1.0" encoding="utf-8"?>
+<p:sld xmlns:a="http://schemas.openxmlformats.org/drawingml/2006/main" xmlns:r="http://schemas.openxmlformats.org/officeDocument/2006/relationships" xmlns:p="http://schemas.openxmlformats.org/presentationml/2006/main">
+  <p:cSld>
+    <p:spTree>
+      <p:nvGrpSpPr>
+        <p:cNvPr id="1" name=""/>
+        <p:cNvGrpSpPr/>
+        <p:nvPr/>
+      </p:nvGrpSpPr>
+      <p:grpSpPr/>
+      <p:sp>
+        <p:nvSpPr>
+          <p:cNvPr id="5" name="Title 4"/>
+          <p:cNvSpPr>
+            <a:spLocks noGrp="1"/>
+          </p:cNvSpPr>
+          <p:nvPr>
+            <p:ph type="title"/>
+          </p:nvPr>
+        </p:nvSpPr>
+        <p:spPr>
+          <a:xfrm>
+            <a:off x="238760" y="122555"/>
+            <a:ext cx="3363595" cy="525780"/>
+          </a:xfrm>
+        </p:spPr>
+        <p:txBody>
+          <a:bodyPr/>
+          <a:p>
+            <a:r>
+              <a:rPr lang="en-US"/>
+              <a:t>Classes</a:t>
+            </a:r>
+            <a:endParaRPr lang="en-US"/>
+          </a:p>
+        </p:txBody>
+      </p:sp>
+      <p:pic>
+        <p:nvPicPr>
+          <p:cNvPr id="4" name="Table Placeholder 3"/>
+          <p:cNvPicPr>
+            <a:picLocks noChangeAspect="1"/>
+          </p:cNvPicPr>
+          <p:nvPr>
+            <p:ph type="tbl" sz="quarter" idx="10"/>
+          </p:nvPr>
+        </p:nvPicPr>
+        <p:blipFill>
+          <a:blip r:embed="rId1"/>
+          <a:stretch>
+            <a:fillRect/>
+          </a:stretch>
+        </p:blipFill>
+        <p:spPr>
+          <a:xfrm>
+            <a:off x="3605530" y="137160"/>
+            <a:ext cx="5363845" cy="6126480"/>
+          </a:xfrm>
+          <a:prstGeom prst="rect">
+            <a:avLst/>
+          </a:prstGeom>
+        </p:spPr>
+      </p:pic>
+      <p:pic>
+        <p:nvPicPr>
+          <p:cNvPr id="6" name="Picture 5"/>
+          <p:cNvPicPr>
+            <a:picLocks noChangeAspect="1"/>
+          </p:cNvPicPr>
+          <p:nvPr/>
+        </p:nvPicPr>
+        <p:blipFill>
+          <a:blip r:embed="rId2"/>
+          <a:stretch>
+            <a:fillRect/>
+          </a:stretch>
+        </p:blipFill>
+        <p:spPr>
+          <a:xfrm>
+            <a:off x="822960" y="574040"/>
+            <a:ext cx="2945130" cy="5498465"/>
           </a:xfrm>
           <a:prstGeom prst="rect">
             <a:avLst/>

</xml_diff>